<commit_message>
added new working example for dot net core and kafka integration
</commit_message>
<xml_diff>
--- a/assets/RabbitMQ.pptx
+++ b/assets/RabbitMQ.pptx
@@ -5,12 +5,13 @@
     <p:sldMasterId id="2147483660" r:id="rId1"/>
   </p:sldMasterIdLst>
   <p:notesMasterIdLst>
-    <p:notesMasterId r:id="rId5"/>
+    <p:notesMasterId r:id="rId6"/>
   </p:notesMasterIdLst>
   <p:sldIdLst>
     <p:sldId id="534" r:id="rId2"/>
     <p:sldId id="536" r:id="rId3"/>
-    <p:sldId id="535" r:id="rId4"/>
+    <p:sldId id="537" r:id="rId4"/>
+    <p:sldId id="535" r:id="rId5"/>
   </p:sldIdLst>
   <p:sldSz cx="12192000" cy="6858000"/>
   <p:notesSz cx="6858000" cy="9144000"/>
@@ -2877,10 +2878,9 @@
           <a:lstStyle/>
           <a:p>
             <a:r>
-              <a:rPr lang="en-US"/>
+              <a:rPr lang="en-US" dirty="0"/>
               <a:t>Reference</a:t>
             </a:r>
-            <a:endParaRPr lang="en-US" dirty="0"/>
           </a:p>
         </p:txBody>
       </p:sp>
@@ -4049,9 +4049,24 @@
           <a:lstStyle/>
           <a:p>
             <a:r>
-              <a:rPr lang="en-US" dirty="0"/>
+              <a:rPr lang="en-US" dirty="0">
+                <a:hlinkClick r:id="rId2"/>
+              </a:rPr>
               <a:t>https://www.youtube.com/watch?v=w84uFSwulBI</a:t>
             </a:r>
+            <a:endParaRPr lang="en-US" dirty="0"/>
+          </a:p>
+          <a:p>
+            <a:r>
+              <a:rPr lang="en-US" dirty="0">
+                <a:hlinkClick r:id="rId3"/>
+              </a:rPr>
+              <a:t>https://www.c-sharpcorner.com/article/rabbitmq-message-queue-using-net-core-6-web-api/</a:t>
+            </a:r>
+            <a:endParaRPr lang="en-US" dirty="0"/>
+          </a:p>
+          <a:p>
+            <a:endParaRPr lang="en-US" dirty="0"/>
           </a:p>
         </p:txBody>
       </p:sp>
@@ -4113,6 +4128,10 @@
           </a:bodyPr>
           <a:lstStyle/>
           <a:p>
+            <a:r>
+              <a:rPr lang="en-US" dirty="0"/>
+              <a:t>DOT NET CORE RABBIT MQ PRODUCER</a:t>
+            </a:r>
             <a:endParaRPr lang="en-IN" dirty="0"/>
           </a:p>
         </p:txBody>
@@ -4139,8 +4158,8 @@
         </p:blipFill>
         <p:spPr>
           <a:xfrm>
-            <a:off x="484992" y="908720"/>
-            <a:ext cx="11222016" cy="2193580"/>
+            <a:off x="551384" y="1052736"/>
+            <a:ext cx="10873208" cy="2193580"/>
           </a:xfrm>
           <a:prstGeom prst="rect">
             <a:avLst/>
@@ -4170,7 +4189,7 @@
         <p:spPr>
           <a:xfrm>
             <a:off x="551384" y="3102300"/>
-            <a:ext cx="11155624" cy="3406428"/>
+            <a:ext cx="10873208" cy="3406428"/>
           </a:xfrm>
           <a:prstGeom prst="rect">
             <a:avLst/>
@@ -4191,6 +4210,66 @@
 </file>
 
 <file path=ppt/slides/slide3.xml><?xml version="1.0" encoding="utf-8"?>
+<p:sld xmlns:a="http://schemas.openxmlformats.org/drawingml/2006/main" xmlns:r="http://schemas.openxmlformats.org/officeDocument/2006/relationships" xmlns:p="http://schemas.openxmlformats.org/presentationml/2006/main">
+  <p:cSld>
+    <p:spTree>
+      <p:nvGrpSpPr>
+        <p:cNvPr id="1" name=""/>
+        <p:cNvGrpSpPr/>
+        <p:nvPr/>
+      </p:nvGrpSpPr>
+      <p:grpSpPr>
+        <a:xfrm>
+          <a:off x="0" y="0"/>
+          <a:ext cx="0" cy="0"/>
+          <a:chOff x="0" y="0"/>
+          <a:chExt cx="0" cy="0"/>
+        </a:xfrm>
+      </p:grpSpPr>
+      <p:pic>
+        <p:nvPicPr>
+          <p:cNvPr id="7" name="Picture 6">
+            <a:extLst>
+              <a:ext uri="{FF2B5EF4-FFF2-40B4-BE49-F238E27FC236}">
+                <a16:creationId xmlns:a16="http://schemas.microsoft.com/office/drawing/2014/main" id="{4816F371-EAE6-D4A8-3DA1-094E028A2F67}"/>
+              </a:ext>
+            </a:extLst>
+          </p:cNvPr>
+          <p:cNvPicPr>
+            <a:picLocks noChangeAspect="1"/>
+          </p:cNvPicPr>
+          <p:nvPr/>
+        </p:nvPicPr>
+        <p:blipFill>
+          <a:blip r:embed="rId2"/>
+          <a:stretch>
+            <a:fillRect/>
+          </a:stretch>
+        </p:blipFill>
+        <p:spPr>
+          <a:xfrm>
+            <a:off x="0" y="270553"/>
+            <a:ext cx="12192000" cy="6316894"/>
+          </a:xfrm>
+          <a:prstGeom prst="rect">
+            <a:avLst/>
+          </a:prstGeom>
+        </p:spPr>
+      </p:pic>
+    </p:spTree>
+    <p:extLst>
+      <p:ext uri="{BB962C8B-B14F-4D97-AF65-F5344CB8AC3E}">
+        <p14:creationId xmlns:p14="http://schemas.microsoft.com/office/powerpoint/2010/main" val="1848985974"/>
+      </p:ext>
+    </p:extLst>
+  </p:cSld>
+  <p:clrMapOvr>
+    <a:masterClrMapping/>
+  </p:clrMapOvr>
+</p:sld>
+</file>
+
+<file path=ppt/slides/slide4.xml><?xml version="1.0" encoding="utf-8"?>
 <p:sld xmlns:a="http://schemas.openxmlformats.org/drawingml/2006/main" xmlns:r="http://schemas.openxmlformats.org/officeDocument/2006/relationships" xmlns:p="http://schemas.openxmlformats.org/presentationml/2006/main">
   <p:cSld>
     <p:bg>

</xml_diff>